<commit_message>
Updated pptx file and added more pdf documents
</commit_message>
<xml_diff>
--- a/NFC_brandi.pptx
+++ b/NFC_brandi.pptx
@@ -5,7 +5,7 @@
     <p:sldMasterId id="2147483684" r:id="rId1"/>
   </p:sldMasterIdLst>
   <p:notesMasterIdLst>
-    <p:notesMasterId r:id="rId13"/>
+    <p:notesMasterId r:id="rId14"/>
   </p:notesMasterIdLst>
   <p:sldIdLst>
     <p:sldId id="256" r:id="rId2"/>
@@ -14,11 +14,12 @@
     <p:sldId id="262" r:id="rId5"/>
     <p:sldId id="266" r:id="rId6"/>
     <p:sldId id="261" r:id="rId7"/>
-    <p:sldId id="259" r:id="rId8"/>
-    <p:sldId id="258" r:id="rId9"/>
-    <p:sldId id="263" r:id="rId10"/>
-    <p:sldId id="265" r:id="rId11"/>
-    <p:sldId id="264" r:id="rId12"/>
+    <p:sldId id="267" r:id="rId8"/>
+    <p:sldId id="259" r:id="rId9"/>
+    <p:sldId id="258" r:id="rId10"/>
+    <p:sldId id="263" r:id="rId11"/>
+    <p:sldId id="265" r:id="rId12"/>
+    <p:sldId id="264" r:id="rId13"/>
   </p:sldIdLst>
   <p:sldSz cx="9144000" cy="6858000" type="screen4x3"/>
   <p:notesSz cx="6858000" cy="9144000"/>
@@ -3583,6 +3584,13 @@
         </dgm:presLayoutVars>
       </dgm:prSet>
       <dgm:spPr/>
+      <dgm:t>
+        <a:bodyPr/>
+        <a:lstStyle/>
+        <a:p>
+          <a:endParaRPr lang="en-US"/>
+        </a:p>
+      </dgm:t>
     </dgm:pt>
     <dgm:pt modelId="{898E7B4B-7D79-409D-9247-2BDBDF9944A2}" type="pres">
       <dgm:prSet presAssocID="{178030DC-726A-4F7F-B6D9-45B4898A896E}" presName="diamond" presStyleLbl="bgShp" presStyleIdx="0" presStyleCnt="1"/>
@@ -3597,6 +3605,13 @@
         </dgm:presLayoutVars>
       </dgm:prSet>
       <dgm:spPr/>
+      <dgm:t>
+        <a:bodyPr/>
+        <a:lstStyle/>
+        <a:p>
+          <a:endParaRPr lang="en-US"/>
+        </a:p>
+      </dgm:t>
     </dgm:pt>
     <dgm:pt modelId="{1CA8266B-5D95-41D0-9056-49C3011D2C19}" type="pres">
       <dgm:prSet presAssocID="{178030DC-726A-4F7F-B6D9-45B4898A896E}" presName="quad2" presStyleLbl="node1" presStyleIdx="1" presStyleCnt="4">
@@ -3607,6 +3622,13 @@
         </dgm:presLayoutVars>
       </dgm:prSet>
       <dgm:spPr/>
+      <dgm:t>
+        <a:bodyPr/>
+        <a:lstStyle/>
+        <a:p>
+          <a:endParaRPr lang="en-US"/>
+        </a:p>
+      </dgm:t>
     </dgm:pt>
     <dgm:pt modelId="{04E939BC-71A7-4396-BB8C-C0AF37034F1B}" type="pres">
       <dgm:prSet presAssocID="{178030DC-726A-4F7F-B6D9-45B4898A896E}" presName="quad3" presStyleLbl="node1" presStyleIdx="2" presStyleCnt="4">
@@ -3617,6 +3639,13 @@
         </dgm:presLayoutVars>
       </dgm:prSet>
       <dgm:spPr/>
+      <dgm:t>
+        <a:bodyPr/>
+        <a:lstStyle/>
+        <a:p>
+          <a:endParaRPr lang="en-US"/>
+        </a:p>
+      </dgm:t>
     </dgm:pt>
     <dgm:pt modelId="{59890E49-B03D-4558-8694-578A7D3A6811}" type="pres">
       <dgm:prSet presAssocID="{178030DC-726A-4F7F-B6D9-45B4898A896E}" presName="quad4" presStyleLbl="node1" presStyleIdx="3" presStyleCnt="4">
@@ -3642,8 +3671,8 @@
     <dgm:cxn modelId="{27BBD0EF-3D40-47C4-9214-1F5AB814D5E2}" srcId="{178030DC-726A-4F7F-B6D9-45B4898A896E}" destId="{2724BF06-9A75-4CC7-AB7A-ED85F53D9F68}" srcOrd="0" destOrd="0" parTransId="{F3C1426C-33E2-476C-8530-A247BE2BA294}" sibTransId="{4EE2FB96-B7F2-4311-BA50-07D4AD5C39F1}"/>
     <dgm:cxn modelId="{4B34A8D4-65D6-46A1-84CC-50B52C82284D}" srcId="{178030DC-726A-4F7F-B6D9-45B4898A896E}" destId="{616D85F2-BA9C-4E78-A0C8-847B651428D6}" srcOrd="3" destOrd="0" parTransId="{A81A9056-DF50-4F46-86F2-CA9597977D86}" sibTransId="{48E7EB04-56B6-4C10-855C-75E54E185E5E}"/>
     <dgm:cxn modelId="{C66E8B73-4D3A-4632-8542-4FEBB03082AD}" type="presOf" srcId="{0C3F0D16-84A4-46F0-8399-68C45BE0CC05}" destId="{04E939BC-71A7-4396-BB8C-C0AF37034F1B}" srcOrd="0" destOrd="0" presId="urn:microsoft.com/office/officeart/2005/8/layout/matrix3"/>
+    <dgm:cxn modelId="{E2F6E7BC-7B66-4D81-A2A4-965490242AE0}" type="presOf" srcId="{616D85F2-BA9C-4E78-A0C8-847B651428D6}" destId="{59890E49-B03D-4558-8694-578A7D3A6811}" srcOrd="0" destOrd="0" presId="urn:microsoft.com/office/officeart/2005/8/layout/matrix3"/>
     <dgm:cxn modelId="{7823AD6D-94B0-4A60-98BE-3495CFDD828F}" type="presOf" srcId="{2724BF06-9A75-4CC7-AB7A-ED85F53D9F68}" destId="{D7FA41AC-5AFE-456B-8B00-AB1ACAB2FF7C}" srcOrd="0" destOrd="0" presId="urn:microsoft.com/office/officeart/2005/8/layout/matrix3"/>
-    <dgm:cxn modelId="{E2F6E7BC-7B66-4D81-A2A4-965490242AE0}" type="presOf" srcId="{616D85F2-BA9C-4E78-A0C8-847B651428D6}" destId="{59890E49-B03D-4558-8694-578A7D3A6811}" srcOrd="0" destOrd="0" presId="urn:microsoft.com/office/officeart/2005/8/layout/matrix3"/>
     <dgm:cxn modelId="{DC698647-0A61-40EC-93A4-B8A860441BD3}" srcId="{178030DC-726A-4F7F-B6D9-45B4898A896E}" destId="{0C3F0D16-84A4-46F0-8399-68C45BE0CC05}" srcOrd="2" destOrd="0" parTransId="{EB968261-3F6E-42D7-8A3C-8743B6E65EF8}" sibTransId="{B25E921C-538E-4A6E-81FB-8E2C42DDD832}"/>
     <dgm:cxn modelId="{BEEC3622-6BD7-4ED8-BD98-ED950D116DCC}" type="presOf" srcId="{F6FCD83F-55E7-40A3-85DC-E7CD163F3992}" destId="{1CA8266B-5D95-41D0-9056-49C3011D2C19}" srcOrd="0" destOrd="0" presId="urn:microsoft.com/office/officeart/2005/8/layout/matrix3"/>
     <dgm:cxn modelId="{213191C0-705B-4665-A86C-D371960FFD9B}" type="presParOf" srcId="{559D0FE3-DDF9-4B61-A624-2891F0A76812}" destId="{898E7B4B-7D79-409D-9247-2BDBDF9944A2}" srcOrd="0" destOrd="0" presId="urn:microsoft.com/office/officeart/2005/8/layout/matrix3"/>
@@ -3656,7 +3685,7 @@
   <dgm:whole/>
   <dgm:extLst>
     <a:ext uri="http://schemas.microsoft.com/office/drawing/2008/diagram">
-      <dsp:dataModelExt xmlns:dsp="http://schemas.microsoft.com/office/drawing/2008/diagram" xmlns="" relId="rId6" minVer="http://schemas.openxmlformats.org/drawingml/2006/diagram"/>
+      <dsp:dataModelExt xmlns:dsp="http://schemas.microsoft.com/office/drawing/2008/diagram" xmlns="" relId="rId7" minVer="http://schemas.openxmlformats.org/drawingml/2006/diagram"/>
     </a:ext>
   </dgm:extLst>
 </dgm:dataModel>
@@ -3724,11 +3753,7 @@
           <a:pPr rtl="0"/>
           <a:r>
             <a:rPr lang="en-US" dirty="0" smtClean="0"/>
-            <a:t>Device acts as a </a:t>
-          </a:r>
-          <a:r>
-            <a:rPr lang="en-US" dirty="0" smtClean="0"/>
-            <a:t>passive tag</a:t>
+            <a:t>Device acts as a passive tag</a:t>
           </a:r>
           <a:endParaRPr lang="en-US" dirty="0"/>
         </a:p>
@@ -4276,7 +4301,7 @@
   <dgm:whole/>
   <dgm:extLst>
     <a:ext uri="http://schemas.microsoft.com/office/drawing/2008/diagram">
-      <dsp:dataModelExt xmlns:dsp="http://schemas.microsoft.com/office/drawing/2008/diagram" xmlns="" relId="rId6" minVer="http://schemas.openxmlformats.org/drawingml/2006/diagram"/>
+      <dsp:dataModelExt xmlns:dsp="http://schemas.microsoft.com/office/drawing/2008/diagram" xmlns="" relId="rId7" minVer="http://schemas.openxmlformats.org/drawingml/2006/diagram"/>
     </a:ext>
   </dgm:extLst>
 </dgm:dataModel>
@@ -4961,8 +4986,8 @@
     <dgm:cxn modelId="{EE88C7A4-A1BB-405B-8497-6CCC7DAD3C14}" srcId="{A647AF76-3372-4282-A7FB-D94F3661BD24}" destId="{FD66A2FA-144D-4B03-8741-032664A8A131}" srcOrd="3" destOrd="0" parTransId="{647BAE80-99F9-4AC7-B50A-5A436F9B35C9}" sibTransId="{FD669672-B1B2-4C3F-BDB3-AD75CF583DA8}"/>
     <dgm:cxn modelId="{FDA1E4D5-AA9E-48B0-AF35-7D1590893200}" type="presOf" srcId="{08FDE10F-F01E-4EF8-9ADB-2D7E2AC130B5}" destId="{E57CEF5C-44CB-4024-A7D8-BCA7E88F8038}" srcOrd="0" destOrd="1" presId="urn:microsoft.com/office/officeart/2005/8/layout/bList2"/>
     <dgm:cxn modelId="{12ED7C03-E9C2-4765-ADE0-D50F6F729122}" type="presOf" srcId="{4B020EA8-A6D1-4F1E-8816-7196A71E6D80}" destId="{FEED18D9-511A-4610-915B-F7BC334A4CE6}" srcOrd="0" destOrd="5" presId="urn:microsoft.com/office/officeart/2005/8/layout/bList2"/>
+    <dgm:cxn modelId="{FF91DD13-089F-4EA3-BD37-930E2FA247B8}" srcId="{A647AF76-3372-4282-A7FB-D94F3661BD24}" destId="{E6A22546-FE8F-41B2-817D-225B83B7FFC6}" srcOrd="5" destOrd="0" parTransId="{9B806525-37EC-4A6B-AD2F-4F2D045724FA}" sibTransId="{239A051C-2127-43AE-8166-B8D871D66546}"/>
     <dgm:cxn modelId="{D504640B-87B8-409B-8117-39F6A19062EE}" type="presOf" srcId="{FD66A2FA-144D-4B03-8741-032664A8A131}" destId="{E57CEF5C-44CB-4024-A7D8-BCA7E88F8038}" srcOrd="0" destOrd="3" presId="urn:microsoft.com/office/officeart/2005/8/layout/bList2"/>
-    <dgm:cxn modelId="{FF91DD13-089F-4EA3-BD37-930E2FA247B8}" srcId="{A647AF76-3372-4282-A7FB-D94F3661BD24}" destId="{E6A22546-FE8F-41B2-817D-225B83B7FFC6}" srcOrd="5" destOrd="0" parTransId="{9B806525-37EC-4A6B-AD2F-4F2D045724FA}" sibTransId="{239A051C-2127-43AE-8166-B8D871D66546}"/>
     <dgm:cxn modelId="{334BDED4-0E4E-4372-9792-C1C02FD97435}" srcId="{BA0B0533-E7A3-44A2-A68F-2E1BB8E85879}" destId="{A647AF76-3372-4282-A7FB-D94F3661BD24}" srcOrd="1" destOrd="0" parTransId="{BEBC477A-72AA-4484-B083-11E51DB3A901}" sibTransId="{053D819F-0F85-4630-8F5B-F82FDB269CAE}"/>
     <dgm:cxn modelId="{4DF24B6A-35FE-4C28-9A1D-F36AB2FC51CB}" type="presOf" srcId="{10B790B8-52AD-43EB-92DC-32B5250316DE}" destId="{DD3F6823-9F5A-44CB-9ABF-726F35A9CC7B}" srcOrd="0" destOrd="0" presId="urn:microsoft.com/office/officeart/2005/8/layout/bList2"/>
     <dgm:cxn modelId="{87C2FD1F-87AC-4C2E-B222-79C20D5AED99}" srcId="{D3CD6361-0534-47AE-A826-3DFAAC0F43F0}" destId="{04B0D5E7-825E-48ED-994B-58C296487BB1}" srcOrd="4" destOrd="0" parTransId="{3C43DBA3-04D5-4438-827A-FF8AB62904E7}" sibTransId="{5B5B22A2-8560-4D68-B0C1-98902B5B5E46}"/>
@@ -5255,6 +5280,13 @@
         </dgm:presLayoutVars>
       </dgm:prSet>
       <dgm:spPr/>
+      <dgm:t>
+        <a:bodyPr/>
+        <a:lstStyle/>
+        <a:p>
+          <a:endParaRPr lang="en-US"/>
+        </a:p>
+      </dgm:t>
     </dgm:pt>
     <dgm:pt modelId="{AE3140F3-D011-4B79-A18F-96FC831AF3DD}" type="pres">
       <dgm:prSet presAssocID="{38FDB9F1-E202-4C33-AB1A-18EF144197AE}" presName="root" presStyleCnt="0"/>
@@ -5267,10 +5299,24 @@
     <dgm:pt modelId="{768F005E-A484-4309-8F14-86445FAF87DD}" type="pres">
       <dgm:prSet presAssocID="{38FDB9F1-E202-4C33-AB1A-18EF144197AE}" presName="rootText" presStyleLbl="node1" presStyleIdx="0" presStyleCnt="3"/>
       <dgm:spPr/>
+      <dgm:t>
+        <a:bodyPr/>
+        <a:lstStyle/>
+        <a:p>
+          <a:endParaRPr lang="en-US"/>
+        </a:p>
+      </dgm:t>
     </dgm:pt>
     <dgm:pt modelId="{A1B6EB25-389A-49C2-BA2F-1BCE6C4DB98D}" type="pres">
       <dgm:prSet presAssocID="{38FDB9F1-E202-4C33-AB1A-18EF144197AE}" presName="rootConnector" presStyleLbl="node1" presStyleIdx="0" presStyleCnt="3"/>
       <dgm:spPr/>
+      <dgm:t>
+        <a:bodyPr/>
+        <a:lstStyle/>
+        <a:p>
+          <a:endParaRPr lang="en-US"/>
+        </a:p>
+      </dgm:t>
     </dgm:pt>
     <dgm:pt modelId="{709A398B-DE4C-4C6E-B7B7-72E114C0A8B6}" type="pres">
       <dgm:prSet presAssocID="{38FDB9F1-E202-4C33-AB1A-18EF144197AE}" presName="childShape" presStyleCnt="0"/>
@@ -5279,6 +5325,13 @@
     <dgm:pt modelId="{59F92D86-7EB4-4DA3-8F8D-FA11DAD86209}" type="pres">
       <dgm:prSet presAssocID="{4380517D-BE21-4B1A-BA9C-B264D6488C41}" presName="Name13" presStyleLbl="parChTrans1D2" presStyleIdx="0" presStyleCnt="3"/>
       <dgm:spPr/>
+      <dgm:t>
+        <a:bodyPr/>
+        <a:lstStyle/>
+        <a:p>
+          <a:endParaRPr lang="en-US"/>
+        </a:p>
+      </dgm:t>
     </dgm:pt>
     <dgm:pt modelId="{AE845357-41FB-45FC-BB51-CD77F8426DF4}" type="pres">
       <dgm:prSet presAssocID="{B6CC46EB-8752-4720-A532-2C506B14AF4A}" presName="childText" presStyleLbl="bgAcc1" presStyleIdx="0" presStyleCnt="3">
@@ -5287,6 +5340,13 @@
         </dgm:presLayoutVars>
       </dgm:prSet>
       <dgm:spPr/>
+      <dgm:t>
+        <a:bodyPr/>
+        <a:lstStyle/>
+        <a:p>
+          <a:endParaRPr lang="en-US"/>
+        </a:p>
+      </dgm:t>
     </dgm:pt>
     <dgm:pt modelId="{6E9B1E6F-BA8F-4023-AAE4-78E76B88F95F}" type="pres">
       <dgm:prSet presAssocID="{3F61756A-FFE2-4736-8F2D-882BD5552AA8}" presName="root" presStyleCnt="0"/>
@@ -5299,10 +5359,24 @@
     <dgm:pt modelId="{4061B5B9-17C4-4D4A-9823-68D18C8355D2}" type="pres">
       <dgm:prSet presAssocID="{3F61756A-FFE2-4736-8F2D-882BD5552AA8}" presName="rootText" presStyleLbl="node1" presStyleIdx="1" presStyleCnt="3"/>
       <dgm:spPr/>
+      <dgm:t>
+        <a:bodyPr/>
+        <a:lstStyle/>
+        <a:p>
+          <a:endParaRPr lang="en-US"/>
+        </a:p>
+      </dgm:t>
     </dgm:pt>
     <dgm:pt modelId="{67A9576A-2067-44AB-AF89-E5F155DC42BE}" type="pres">
       <dgm:prSet presAssocID="{3F61756A-FFE2-4736-8F2D-882BD5552AA8}" presName="rootConnector" presStyleLbl="node1" presStyleIdx="1" presStyleCnt="3"/>
       <dgm:spPr/>
+      <dgm:t>
+        <a:bodyPr/>
+        <a:lstStyle/>
+        <a:p>
+          <a:endParaRPr lang="en-US"/>
+        </a:p>
+      </dgm:t>
     </dgm:pt>
     <dgm:pt modelId="{1FC3B049-62EA-4A5B-A6DB-BB1C5820DDFA}" type="pres">
       <dgm:prSet presAssocID="{3F61756A-FFE2-4736-8F2D-882BD5552AA8}" presName="childShape" presStyleCnt="0"/>
@@ -5311,6 +5385,13 @@
     <dgm:pt modelId="{64C6F06D-75A8-412A-8DD5-5A436B420339}" type="pres">
       <dgm:prSet presAssocID="{F6F22387-4B49-4A26-A161-4ACA904D9707}" presName="Name13" presStyleLbl="parChTrans1D2" presStyleIdx="1" presStyleCnt="3"/>
       <dgm:spPr/>
+      <dgm:t>
+        <a:bodyPr/>
+        <a:lstStyle/>
+        <a:p>
+          <a:endParaRPr lang="en-US"/>
+        </a:p>
+      </dgm:t>
     </dgm:pt>
     <dgm:pt modelId="{7AD682C4-D691-480B-B251-95985202C79F}" type="pres">
       <dgm:prSet presAssocID="{A5770817-7B6E-41FC-8EC8-FC57ED4F78C2}" presName="childText" presStyleLbl="bgAcc1" presStyleIdx="1" presStyleCnt="3">
@@ -5319,6 +5400,13 @@
         </dgm:presLayoutVars>
       </dgm:prSet>
       <dgm:spPr/>
+      <dgm:t>
+        <a:bodyPr/>
+        <a:lstStyle/>
+        <a:p>
+          <a:endParaRPr lang="en-US"/>
+        </a:p>
+      </dgm:t>
     </dgm:pt>
     <dgm:pt modelId="{18538623-AF39-44C8-8936-E9B09B9D47C7}" type="pres">
       <dgm:prSet presAssocID="{723E0E71-C2E9-450E-B9D5-9A9F177859A2}" presName="root" presStyleCnt="0"/>
@@ -5331,10 +5419,24 @@
     <dgm:pt modelId="{6B893459-FD32-44E5-B068-09AE2EFEA057}" type="pres">
       <dgm:prSet presAssocID="{723E0E71-C2E9-450E-B9D5-9A9F177859A2}" presName="rootText" presStyleLbl="node1" presStyleIdx="2" presStyleCnt="3"/>
       <dgm:spPr/>
+      <dgm:t>
+        <a:bodyPr/>
+        <a:lstStyle/>
+        <a:p>
+          <a:endParaRPr lang="en-US"/>
+        </a:p>
+      </dgm:t>
     </dgm:pt>
     <dgm:pt modelId="{8EDBB0EB-7C12-459A-978A-AFCC46C3EDB0}" type="pres">
       <dgm:prSet presAssocID="{723E0E71-C2E9-450E-B9D5-9A9F177859A2}" presName="rootConnector" presStyleLbl="node1" presStyleIdx="2" presStyleCnt="3"/>
       <dgm:spPr/>
+      <dgm:t>
+        <a:bodyPr/>
+        <a:lstStyle/>
+        <a:p>
+          <a:endParaRPr lang="en-US"/>
+        </a:p>
+      </dgm:t>
     </dgm:pt>
     <dgm:pt modelId="{EABA646A-54E2-420B-AF6E-31A79DD3797B}" type="pres">
       <dgm:prSet presAssocID="{723E0E71-C2E9-450E-B9D5-9A9F177859A2}" presName="childShape" presStyleCnt="0"/>
@@ -5343,6 +5445,13 @@
     <dgm:pt modelId="{D309E9B5-F4E0-4763-94F9-8AE08AF244C6}" type="pres">
       <dgm:prSet presAssocID="{AF0C6532-1EF5-4DC0-9401-7A7F8E950A6A}" presName="Name13" presStyleLbl="parChTrans1D2" presStyleIdx="2" presStyleCnt="3"/>
       <dgm:spPr/>
+      <dgm:t>
+        <a:bodyPr/>
+        <a:lstStyle/>
+        <a:p>
+          <a:endParaRPr lang="en-US"/>
+        </a:p>
+      </dgm:t>
     </dgm:pt>
     <dgm:pt modelId="{041506C0-697F-485C-BE27-E9A388660F88}" type="pres">
       <dgm:prSet presAssocID="{BFB06111-A6C6-4067-9DF0-56E2DB1125D5}" presName="childText" presStyleLbl="bgAcc1" presStyleIdx="2" presStyleCnt="3">
@@ -5351,6 +5460,13 @@
         </dgm:presLayoutVars>
       </dgm:prSet>
       <dgm:spPr/>
+      <dgm:t>
+        <a:bodyPr/>
+        <a:lstStyle/>
+        <a:p>
+          <a:endParaRPr lang="en-US"/>
+        </a:p>
+      </dgm:t>
     </dgm:pt>
   </dgm:ptLst>
   <dgm:cxnLst>
@@ -5399,7 +5515,7 @@
   <dgm:whole/>
   <dgm:extLst>
     <a:ext uri="http://schemas.microsoft.com/office/drawing/2008/diagram">
-      <dsp:dataModelExt xmlns:dsp="http://schemas.microsoft.com/office/drawing/2008/diagram" xmlns="" relId="rId6" minVer="http://schemas.openxmlformats.org/drawingml/2006/diagram"/>
+      <dsp:dataModelExt xmlns:dsp="http://schemas.microsoft.com/office/drawing/2008/diagram" xmlns="" relId="rId7" minVer="http://schemas.openxmlformats.org/drawingml/2006/diagram"/>
     </a:ext>
   </dgm:extLst>
 </dgm:dataModel>
@@ -5912,11 +6028,7 @@
           </a:pPr>
           <a:r>
             <a:rPr lang="en-US" sz="2100" kern="1200" dirty="0" smtClean="0"/>
-            <a:t>Device acts as a </a:t>
-          </a:r>
-          <a:r>
-            <a:rPr lang="en-US" sz="2100" kern="1200" dirty="0" smtClean="0"/>
-            <a:t>passive tag</a:t>
+            <a:t>Device acts as a passive tag</a:t>
           </a:r>
           <a:endParaRPr lang="en-US" sz="2100" kern="1200" dirty="0"/>
         </a:p>
@@ -12988,7 +13100,8 @@
           <a:p>
             <a:fld id="{8AE786AB-24B3-4FB8-BF92-1B117D0FE415}" type="datetimeFigureOut">
               <a:rPr lang="en-US" smtClean="0"/>
-              <a:t>3/29/2014</a:t>
+              <a:pPr/>
+              <a:t>4/1/2014</a:t>
             </a:fld>
             <a:endParaRPr lang="en-US"/>
           </a:p>
@@ -13149,6 +13262,7 @@
           <a:p>
             <a:fld id="{394D8DB5-5FC1-4510-BABE-87359DBFAF17}" type="slidenum">
               <a:rPr lang="en-US" smtClean="0"/>
+              <a:pPr/>
               <a:t>‹#›</a:t>
             </a:fld>
             <a:endParaRPr lang="en-US"/>
@@ -13299,6 +13413,498 @@
           </a:bodyPr>
           <a:lstStyle/>
           <a:p>
+            <a:endParaRPr lang="en-US"/>
+          </a:p>
+        </p:txBody>
+      </p:sp>
+      <p:sp>
+        <p:nvSpPr>
+          <p:cNvPr id="4" name="Slide Number Placeholder 3"/>
+          <p:cNvSpPr>
+            <a:spLocks noGrp="1"/>
+          </p:cNvSpPr>
+          <p:nvPr>
+            <p:ph type="sldNum" sz="quarter" idx="10"/>
+          </p:nvPr>
+        </p:nvSpPr>
+        <p:spPr/>
+        <p:txBody>
+          <a:bodyPr/>
+          <a:lstStyle/>
+          <a:p>
+            <a:fld id="{394D8DB5-5FC1-4510-BABE-87359DBFAF17}" type="slidenum">
+              <a:rPr lang="en-US" smtClean="0"/>
+              <a:pPr/>
+              <a:t>1</a:t>
+            </a:fld>
+            <a:endParaRPr lang="en-US"/>
+          </a:p>
+        </p:txBody>
+      </p:sp>
+    </p:spTree>
+  </p:cSld>
+  <p:clrMapOvr>
+    <a:masterClrMapping/>
+  </p:clrMapOvr>
+</p:notes>
+</file>
+
+<file path=ppt/notesSlides/notesSlide10.xml><?xml version="1.0" encoding="utf-8"?>
+<p:notes xmlns:a="http://schemas.openxmlformats.org/drawingml/2006/main" xmlns:r="http://schemas.openxmlformats.org/officeDocument/2006/relationships" xmlns:p="http://schemas.openxmlformats.org/presentationml/2006/main">
+  <p:cSld>
+    <p:spTree>
+      <p:nvGrpSpPr>
+        <p:cNvPr id="1" name=""/>
+        <p:cNvGrpSpPr/>
+        <p:nvPr/>
+      </p:nvGrpSpPr>
+      <p:grpSpPr>
+        <a:xfrm>
+          <a:off x="0" y="0"/>
+          <a:ext cx="0" cy="0"/>
+          <a:chOff x="0" y="0"/>
+          <a:chExt cx="0" cy="0"/>
+        </a:xfrm>
+      </p:grpSpPr>
+      <p:sp>
+        <p:nvSpPr>
+          <p:cNvPr id="2" name="Slide Image Placeholder 1"/>
+          <p:cNvSpPr>
+            <a:spLocks noGrp="1" noRot="1" noChangeAspect="1"/>
+          </p:cNvSpPr>
+          <p:nvPr>
+            <p:ph type="sldImg"/>
+          </p:nvPr>
+        </p:nvSpPr>
+        <p:spPr/>
+      </p:sp>
+      <p:sp>
+        <p:nvSpPr>
+          <p:cNvPr id="3" name="Notes Placeholder 2"/>
+          <p:cNvSpPr>
+            <a:spLocks noGrp="1"/>
+          </p:cNvSpPr>
+          <p:nvPr>
+            <p:ph type="body" idx="1"/>
+          </p:nvPr>
+        </p:nvSpPr>
+        <p:spPr/>
+        <p:txBody>
+          <a:bodyPr>
+            <a:normAutofit/>
+          </a:bodyPr>
+          <a:lstStyle/>
+          <a:p>
+            <a:endParaRPr lang="en-US"/>
+          </a:p>
+        </p:txBody>
+      </p:sp>
+      <p:sp>
+        <p:nvSpPr>
+          <p:cNvPr id="4" name="Slide Number Placeholder 3"/>
+          <p:cNvSpPr>
+            <a:spLocks noGrp="1"/>
+          </p:cNvSpPr>
+          <p:nvPr>
+            <p:ph type="sldNum" sz="quarter" idx="10"/>
+          </p:nvPr>
+        </p:nvSpPr>
+        <p:spPr/>
+        <p:txBody>
+          <a:bodyPr/>
+          <a:lstStyle/>
+          <a:p>
+            <a:fld id="{394D8DB5-5FC1-4510-BABE-87359DBFAF17}" type="slidenum">
+              <a:rPr lang="en-US" smtClean="0"/>
+              <a:pPr/>
+              <a:t>10</a:t>
+            </a:fld>
+            <a:endParaRPr lang="en-US"/>
+          </a:p>
+        </p:txBody>
+      </p:sp>
+    </p:spTree>
+  </p:cSld>
+  <p:clrMapOvr>
+    <a:masterClrMapping/>
+  </p:clrMapOvr>
+</p:notes>
+</file>
+
+<file path=ppt/notesSlides/notesSlide11.xml><?xml version="1.0" encoding="utf-8"?>
+<p:notes xmlns:a="http://schemas.openxmlformats.org/drawingml/2006/main" xmlns:r="http://schemas.openxmlformats.org/officeDocument/2006/relationships" xmlns:p="http://schemas.openxmlformats.org/presentationml/2006/main">
+  <p:cSld>
+    <p:spTree>
+      <p:nvGrpSpPr>
+        <p:cNvPr id="1" name=""/>
+        <p:cNvGrpSpPr/>
+        <p:nvPr/>
+      </p:nvGrpSpPr>
+      <p:grpSpPr>
+        <a:xfrm>
+          <a:off x="0" y="0"/>
+          <a:ext cx="0" cy="0"/>
+          <a:chOff x="0" y="0"/>
+          <a:chExt cx="0" cy="0"/>
+        </a:xfrm>
+      </p:grpSpPr>
+      <p:sp>
+        <p:nvSpPr>
+          <p:cNvPr id="2" name="Slide Image Placeholder 1"/>
+          <p:cNvSpPr>
+            <a:spLocks noGrp="1" noRot="1" noChangeAspect="1"/>
+          </p:cNvSpPr>
+          <p:nvPr>
+            <p:ph type="sldImg"/>
+          </p:nvPr>
+        </p:nvSpPr>
+        <p:spPr/>
+      </p:sp>
+      <p:sp>
+        <p:nvSpPr>
+          <p:cNvPr id="3" name="Notes Placeholder 2"/>
+          <p:cNvSpPr>
+            <a:spLocks noGrp="1"/>
+          </p:cNvSpPr>
+          <p:nvPr>
+            <p:ph type="body" idx="1"/>
+          </p:nvPr>
+        </p:nvSpPr>
+        <p:spPr/>
+        <p:txBody>
+          <a:bodyPr>
+            <a:normAutofit/>
+          </a:bodyPr>
+          <a:lstStyle/>
+          <a:p>
+            <a:endParaRPr lang="en-US"/>
+          </a:p>
+        </p:txBody>
+      </p:sp>
+      <p:sp>
+        <p:nvSpPr>
+          <p:cNvPr id="4" name="Slide Number Placeholder 3"/>
+          <p:cNvSpPr>
+            <a:spLocks noGrp="1"/>
+          </p:cNvSpPr>
+          <p:nvPr>
+            <p:ph type="sldNum" sz="quarter" idx="10"/>
+          </p:nvPr>
+        </p:nvSpPr>
+        <p:spPr/>
+        <p:txBody>
+          <a:bodyPr/>
+          <a:lstStyle/>
+          <a:p>
+            <a:fld id="{394D8DB5-5FC1-4510-BABE-87359DBFAF17}" type="slidenum">
+              <a:rPr lang="en-US" smtClean="0"/>
+              <a:pPr/>
+              <a:t>11</a:t>
+            </a:fld>
+            <a:endParaRPr lang="en-US"/>
+          </a:p>
+        </p:txBody>
+      </p:sp>
+    </p:spTree>
+  </p:cSld>
+  <p:clrMapOvr>
+    <a:masterClrMapping/>
+  </p:clrMapOvr>
+</p:notes>
+</file>
+
+<file path=ppt/notesSlides/notesSlide12.xml><?xml version="1.0" encoding="utf-8"?>
+<p:notes xmlns:a="http://schemas.openxmlformats.org/drawingml/2006/main" xmlns:r="http://schemas.openxmlformats.org/officeDocument/2006/relationships" xmlns:p="http://schemas.openxmlformats.org/presentationml/2006/main">
+  <p:cSld>
+    <p:spTree>
+      <p:nvGrpSpPr>
+        <p:cNvPr id="1" name=""/>
+        <p:cNvGrpSpPr/>
+        <p:nvPr/>
+      </p:nvGrpSpPr>
+      <p:grpSpPr>
+        <a:xfrm>
+          <a:off x="0" y="0"/>
+          <a:ext cx="0" cy="0"/>
+          <a:chOff x="0" y="0"/>
+          <a:chExt cx="0" cy="0"/>
+        </a:xfrm>
+      </p:grpSpPr>
+      <p:sp>
+        <p:nvSpPr>
+          <p:cNvPr id="2" name="Slide Image Placeholder 1"/>
+          <p:cNvSpPr>
+            <a:spLocks noGrp="1" noRot="1" noChangeAspect="1"/>
+          </p:cNvSpPr>
+          <p:nvPr>
+            <p:ph type="sldImg"/>
+          </p:nvPr>
+        </p:nvSpPr>
+        <p:spPr/>
+      </p:sp>
+      <p:sp>
+        <p:nvSpPr>
+          <p:cNvPr id="3" name="Notes Placeholder 2"/>
+          <p:cNvSpPr>
+            <a:spLocks noGrp="1"/>
+          </p:cNvSpPr>
+          <p:nvPr>
+            <p:ph type="body" idx="1"/>
+          </p:nvPr>
+        </p:nvSpPr>
+        <p:spPr/>
+        <p:txBody>
+          <a:bodyPr>
+            <a:normAutofit/>
+          </a:bodyPr>
+          <a:lstStyle/>
+          <a:p>
+            <a:endParaRPr lang="en-US"/>
+          </a:p>
+        </p:txBody>
+      </p:sp>
+      <p:sp>
+        <p:nvSpPr>
+          <p:cNvPr id="4" name="Slide Number Placeholder 3"/>
+          <p:cNvSpPr>
+            <a:spLocks noGrp="1"/>
+          </p:cNvSpPr>
+          <p:nvPr>
+            <p:ph type="sldNum" sz="quarter" idx="10"/>
+          </p:nvPr>
+        </p:nvSpPr>
+        <p:spPr/>
+        <p:txBody>
+          <a:bodyPr/>
+          <a:lstStyle/>
+          <a:p>
+            <a:fld id="{394D8DB5-5FC1-4510-BABE-87359DBFAF17}" type="slidenum">
+              <a:rPr lang="en-US" smtClean="0"/>
+              <a:pPr/>
+              <a:t>12</a:t>
+            </a:fld>
+            <a:endParaRPr lang="en-US"/>
+          </a:p>
+        </p:txBody>
+      </p:sp>
+    </p:spTree>
+  </p:cSld>
+  <p:clrMapOvr>
+    <a:masterClrMapping/>
+  </p:clrMapOvr>
+</p:notes>
+</file>
+
+<file path=ppt/notesSlides/notesSlide2.xml><?xml version="1.0" encoding="utf-8"?>
+<p:notes xmlns:a="http://schemas.openxmlformats.org/drawingml/2006/main" xmlns:r="http://schemas.openxmlformats.org/officeDocument/2006/relationships" xmlns:p="http://schemas.openxmlformats.org/presentationml/2006/main">
+  <p:cSld>
+    <p:spTree>
+      <p:nvGrpSpPr>
+        <p:cNvPr id="1" name=""/>
+        <p:cNvGrpSpPr/>
+        <p:nvPr/>
+      </p:nvGrpSpPr>
+      <p:grpSpPr>
+        <a:xfrm>
+          <a:off x="0" y="0"/>
+          <a:ext cx="0" cy="0"/>
+          <a:chOff x="0" y="0"/>
+          <a:chExt cx="0" cy="0"/>
+        </a:xfrm>
+      </p:grpSpPr>
+      <p:sp>
+        <p:nvSpPr>
+          <p:cNvPr id="2" name="Slide Image Placeholder 1"/>
+          <p:cNvSpPr>
+            <a:spLocks noGrp="1" noRot="1" noChangeAspect="1"/>
+          </p:cNvSpPr>
+          <p:nvPr>
+            <p:ph type="sldImg"/>
+          </p:nvPr>
+        </p:nvSpPr>
+        <p:spPr/>
+      </p:sp>
+      <p:sp>
+        <p:nvSpPr>
+          <p:cNvPr id="3" name="Notes Placeholder 2"/>
+          <p:cNvSpPr>
+            <a:spLocks noGrp="1"/>
+          </p:cNvSpPr>
+          <p:nvPr>
+            <p:ph type="body" idx="1"/>
+          </p:nvPr>
+        </p:nvSpPr>
+        <p:spPr/>
+        <p:txBody>
+          <a:bodyPr>
+            <a:normAutofit/>
+          </a:bodyPr>
+          <a:lstStyle/>
+          <a:p>
+            <a:endParaRPr lang="en-US"/>
+          </a:p>
+        </p:txBody>
+      </p:sp>
+      <p:sp>
+        <p:nvSpPr>
+          <p:cNvPr id="4" name="Slide Number Placeholder 3"/>
+          <p:cNvSpPr>
+            <a:spLocks noGrp="1"/>
+          </p:cNvSpPr>
+          <p:nvPr>
+            <p:ph type="sldNum" sz="quarter" idx="10"/>
+          </p:nvPr>
+        </p:nvSpPr>
+        <p:spPr/>
+        <p:txBody>
+          <a:bodyPr/>
+          <a:lstStyle/>
+          <a:p>
+            <a:fld id="{394D8DB5-5FC1-4510-BABE-87359DBFAF17}" type="slidenum">
+              <a:rPr lang="en-US" smtClean="0"/>
+              <a:pPr/>
+              <a:t>2</a:t>
+            </a:fld>
+            <a:endParaRPr lang="en-US"/>
+          </a:p>
+        </p:txBody>
+      </p:sp>
+    </p:spTree>
+  </p:cSld>
+  <p:clrMapOvr>
+    <a:masterClrMapping/>
+  </p:clrMapOvr>
+</p:notes>
+</file>
+
+<file path=ppt/notesSlides/notesSlide3.xml><?xml version="1.0" encoding="utf-8"?>
+<p:notes xmlns:a="http://schemas.openxmlformats.org/drawingml/2006/main" xmlns:r="http://schemas.openxmlformats.org/officeDocument/2006/relationships" xmlns:p="http://schemas.openxmlformats.org/presentationml/2006/main">
+  <p:cSld>
+    <p:spTree>
+      <p:nvGrpSpPr>
+        <p:cNvPr id="1" name=""/>
+        <p:cNvGrpSpPr/>
+        <p:nvPr/>
+      </p:nvGrpSpPr>
+      <p:grpSpPr>
+        <a:xfrm>
+          <a:off x="0" y="0"/>
+          <a:ext cx="0" cy="0"/>
+          <a:chOff x="0" y="0"/>
+          <a:chExt cx="0" cy="0"/>
+        </a:xfrm>
+      </p:grpSpPr>
+      <p:sp>
+        <p:nvSpPr>
+          <p:cNvPr id="2" name="Slide Image Placeholder 1"/>
+          <p:cNvSpPr>
+            <a:spLocks noGrp="1" noRot="1" noChangeAspect="1"/>
+          </p:cNvSpPr>
+          <p:nvPr>
+            <p:ph type="sldImg"/>
+          </p:nvPr>
+        </p:nvSpPr>
+        <p:spPr/>
+      </p:sp>
+      <p:sp>
+        <p:nvSpPr>
+          <p:cNvPr id="3" name="Notes Placeholder 2"/>
+          <p:cNvSpPr>
+            <a:spLocks noGrp="1"/>
+          </p:cNvSpPr>
+          <p:nvPr>
+            <p:ph type="body" idx="1"/>
+          </p:nvPr>
+        </p:nvSpPr>
+        <p:spPr/>
+        <p:txBody>
+          <a:bodyPr>
+            <a:normAutofit/>
+          </a:bodyPr>
+          <a:lstStyle/>
+          <a:p>
+            <a:endParaRPr lang="en-US"/>
+          </a:p>
+        </p:txBody>
+      </p:sp>
+      <p:sp>
+        <p:nvSpPr>
+          <p:cNvPr id="4" name="Slide Number Placeholder 3"/>
+          <p:cNvSpPr>
+            <a:spLocks noGrp="1"/>
+          </p:cNvSpPr>
+          <p:nvPr>
+            <p:ph type="sldNum" sz="quarter" idx="10"/>
+          </p:nvPr>
+        </p:nvSpPr>
+        <p:spPr/>
+        <p:txBody>
+          <a:bodyPr/>
+          <a:lstStyle/>
+          <a:p>
+            <a:fld id="{394D8DB5-5FC1-4510-BABE-87359DBFAF17}" type="slidenum">
+              <a:rPr lang="en-US" smtClean="0"/>
+              <a:pPr/>
+              <a:t>3</a:t>
+            </a:fld>
+            <a:endParaRPr lang="en-US"/>
+          </a:p>
+        </p:txBody>
+      </p:sp>
+    </p:spTree>
+  </p:cSld>
+  <p:clrMapOvr>
+    <a:masterClrMapping/>
+  </p:clrMapOvr>
+</p:notes>
+</file>
+
+<file path=ppt/notesSlides/notesSlide4.xml><?xml version="1.0" encoding="utf-8"?>
+<p:notes xmlns:a="http://schemas.openxmlformats.org/drawingml/2006/main" xmlns:r="http://schemas.openxmlformats.org/officeDocument/2006/relationships" xmlns:p="http://schemas.openxmlformats.org/presentationml/2006/main">
+  <p:cSld>
+    <p:spTree>
+      <p:nvGrpSpPr>
+        <p:cNvPr id="1" name=""/>
+        <p:cNvGrpSpPr/>
+        <p:nvPr/>
+      </p:nvGrpSpPr>
+      <p:grpSpPr>
+        <a:xfrm>
+          <a:off x="0" y="0"/>
+          <a:ext cx="0" cy="0"/>
+          <a:chOff x="0" y="0"/>
+          <a:chExt cx="0" cy="0"/>
+        </a:xfrm>
+      </p:grpSpPr>
+      <p:sp>
+        <p:nvSpPr>
+          <p:cNvPr id="2" name="Slide Image Placeholder 1"/>
+          <p:cNvSpPr>
+            <a:spLocks noGrp="1" noRot="1" noChangeAspect="1"/>
+          </p:cNvSpPr>
+          <p:nvPr>
+            <p:ph type="sldImg"/>
+          </p:nvPr>
+        </p:nvSpPr>
+        <p:spPr/>
+      </p:sp>
+      <p:sp>
+        <p:nvSpPr>
+          <p:cNvPr id="3" name="Notes Placeholder 2"/>
+          <p:cNvSpPr>
+            <a:spLocks noGrp="1"/>
+          </p:cNvSpPr>
+          <p:nvPr>
+            <p:ph type="body" idx="1"/>
+          </p:nvPr>
+        </p:nvSpPr>
+        <p:spPr/>
+        <p:txBody>
+          <a:bodyPr>
+            <a:normAutofit/>
+          </a:bodyPr>
+          <a:lstStyle/>
+          <a:p>
             <a:pPr marL="0" marR="0" indent="0" algn="l" defTabSz="914400" rtl="0" eaLnBrk="1" fontAlgn="auto" latinLnBrk="0" hangingPunct="1">
               <a:lnSpc>
                 <a:spcPct val="100000"/>
@@ -13402,6 +14008,7 @@
           <a:p>
             <a:fld id="{394D8DB5-5FC1-4510-BABE-87359DBFAF17}" type="slidenum">
               <a:rPr lang="en-US" smtClean="0"/>
+              <a:pPr/>
               <a:t>4</a:t>
             </a:fld>
             <a:endParaRPr lang="en-US"/>
@@ -13416,7 +14023,7 @@
 </p:notes>
 </file>
 
-<file path=ppt/notesSlides/notesSlide2.xml><?xml version="1.0" encoding="utf-8"?>
+<file path=ppt/notesSlides/notesSlide5.xml><?xml version="1.0" encoding="utf-8"?>
 <p:notes xmlns:a="http://schemas.openxmlformats.org/drawingml/2006/main" xmlns:r="http://schemas.openxmlformats.org/officeDocument/2006/relationships" xmlns:p="http://schemas.openxmlformats.org/presentationml/2006/main">
   <p:cSld>
     <p:spTree>
@@ -13775,6 +14382,7 @@
           <a:p>
             <a:fld id="{394D8DB5-5FC1-4510-BABE-87359DBFAF17}" type="slidenum">
               <a:rPr lang="en-US" smtClean="0"/>
+              <a:pPr/>
               <a:t>5</a:t>
             </a:fld>
             <a:endParaRPr lang="en-US"/>
@@ -13789,7 +14397,7 @@
 </p:notes>
 </file>
 
-<file path=ppt/notesSlides/notesSlide3.xml><?xml version="1.0" encoding="utf-8"?>
+<file path=ppt/notesSlides/notesSlide6.xml><?xml version="1.0" encoding="utf-8"?>
 <p:notes xmlns:a="http://schemas.openxmlformats.org/drawingml/2006/main" xmlns:r="http://schemas.openxmlformats.org/officeDocument/2006/relationships" xmlns:p="http://schemas.openxmlformats.org/presentationml/2006/main">
   <p:cSld>
     <p:spTree>
@@ -13835,7 +14443,7 @@
           </a:bodyPr>
           <a:lstStyle/>
           <a:p>
-            <a:endParaRPr lang="en-US" dirty="0"/>
+            <a:endParaRPr lang="en-US"/>
           </a:p>
         </p:txBody>
       </p:sp>
@@ -13856,7 +14464,8 @@
           <a:p>
             <a:fld id="{394D8DB5-5FC1-4510-BABE-87359DBFAF17}" type="slidenum">
               <a:rPr lang="en-US" smtClean="0"/>
-              <a:t>7</a:t>
+              <a:pPr/>
+              <a:t>6</a:t>
             </a:fld>
             <a:endParaRPr lang="en-US"/>
           </a:p>
@@ -13870,7 +14479,7 @@
 </p:notes>
 </file>
 
-<file path=ppt/notesSlides/notesSlide4.xml><?xml version="1.0" encoding="utf-8"?>
+<file path=ppt/notesSlides/notesSlide7.xml><?xml version="1.0" encoding="utf-8"?>
 <p:notes xmlns:a="http://schemas.openxmlformats.org/drawingml/2006/main" xmlns:r="http://schemas.openxmlformats.org/officeDocument/2006/relationships" xmlns:p="http://schemas.openxmlformats.org/presentationml/2006/main">
   <p:cSld>
     <p:spTree>
@@ -13916,7 +14525,7 @@
           </a:bodyPr>
           <a:lstStyle/>
           <a:p>
-            <a:endParaRPr lang="en-US" dirty="0"/>
+            <a:endParaRPr lang="en-US"/>
           </a:p>
         </p:txBody>
       </p:sp>
@@ -13937,7 +14546,172 @@
           <a:p>
             <a:fld id="{394D8DB5-5FC1-4510-BABE-87359DBFAF17}" type="slidenum">
               <a:rPr lang="en-US" smtClean="0"/>
+              <a:pPr/>
+              <a:t>7</a:t>
+            </a:fld>
+            <a:endParaRPr lang="en-US"/>
+          </a:p>
+        </p:txBody>
+      </p:sp>
+    </p:spTree>
+  </p:cSld>
+  <p:clrMapOvr>
+    <a:masterClrMapping/>
+  </p:clrMapOvr>
+</p:notes>
+</file>
+
+<file path=ppt/notesSlides/notesSlide8.xml><?xml version="1.0" encoding="utf-8"?>
+<p:notes xmlns:a="http://schemas.openxmlformats.org/drawingml/2006/main" xmlns:r="http://schemas.openxmlformats.org/officeDocument/2006/relationships" xmlns:p="http://schemas.openxmlformats.org/presentationml/2006/main">
+  <p:cSld>
+    <p:spTree>
+      <p:nvGrpSpPr>
+        <p:cNvPr id="1" name=""/>
+        <p:cNvGrpSpPr/>
+        <p:nvPr/>
+      </p:nvGrpSpPr>
+      <p:grpSpPr>
+        <a:xfrm>
+          <a:off x="0" y="0"/>
+          <a:ext cx="0" cy="0"/>
+          <a:chOff x="0" y="0"/>
+          <a:chExt cx="0" cy="0"/>
+        </a:xfrm>
+      </p:grpSpPr>
+      <p:sp>
+        <p:nvSpPr>
+          <p:cNvPr id="2" name="Slide Image Placeholder 1"/>
+          <p:cNvSpPr>
+            <a:spLocks noGrp="1" noRot="1" noChangeAspect="1"/>
+          </p:cNvSpPr>
+          <p:nvPr>
+            <p:ph type="sldImg"/>
+          </p:nvPr>
+        </p:nvSpPr>
+        <p:spPr/>
+      </p:sp>
+      <p:sp>
+        <p:nvSpPr>
+          <p:cNvPr id="3" name="Notes Placeholder 2"/>
+          <p:cNvSpPr>
+            <a:spLocks noGrp="1"/>
+          </p:cNvSpPr>
+          <p:nvPr>
+            <p:ph type="body" idx="1"/>
+          </p:nvPr>
+        </p:nvSpPr>
+        <p:spPr/>
+        <p:txBody>
+          <a:bodyPr>
+            <a:normAutofit/>
+          </a:bodyPr>
+          <a:lstStyle/>
+          <a:p>
+            <a:endParaRPr lang="en-US" dirty="0"/>
+          </a:p>
+        </p:txBody>
+      </p:sp>
+      <p:sp>
+        <p:nvSpPr>
+          <p:cNvPr id="4" name="Slide Number Placeholder 3"/>
+          <p:cNvSpPr>
+            <a:spLocks noGrp="1"/>
+          </p:cNvSpPr>
+          <p:nvPr>
+            <p:ph type="sldNum" sz="quarter" idx="10"/>
+          </p:nvPr>
+        </p:nvSpPr>
+        <p:spPr/>
+        <p:txBody>
+          <a:bodyPr/>
+          <a:lstStyle/>
+          <a:p>
+            <a:fld id="{394D8DB5-5FC1-4510-BABE-87359DBFAF17}" type="slidenum">
+              <a:rPr lang="en-US" smtClean="0"/>
+              <a:pPr/>
               <a:t>8</a:t>
+            </a:fld>
+            <a:endParaRPr lang="en-US"/>
+          </a:p>
+        </p:txBody>
+      </p:sp>
+    </p:spTree>
+  </p:cSld>
+  <p:clrMapOvr>
+    <a:masterClrMapping/>
+  </p:clrMapOvr>
+</p:notes>
+</file>
+
+<file path=ppt/notesSlides/notesSlide9.xml><?xml version="1.0" encoding="utf-8"?>
+<p:notes xmlns:a="http://schemas.openxmlformats.org/drawingml/2006/main" xmlns:r="http://schemas.openxmlformats.org/officeDocument/2006/relationships" xmlns:p="http://schemas.openxmlformats.org/presentationml/2006/main">
+  <p:cSld>
+    <p:spTree>
+      <p:nvGrpSpPr>
+        <p:cNvPr id="1" name=""/>
+        <p:cNvGrpSpPr/>
+        <p:nvPr/>
+      </p:nvGrpSpPr>
+      <p:grpSpPr>
+        <a:xfrm>
+          <a:off x="0" y="0"/>
+          <a:ext cx="0" cy="0"/>
+          <a:chOff x="0" y="0"/>
+          <a:chExt cx="0" cy="0"/>
+        </a:xfrm>
+      </p:grpSpPr>
+      <p:sp>
+        <p:nvSpPr>
+          <p:cNvPr id="2" name="Slide Image Placeholder 1"/>
+          <p:cNvSpPr>
+            <a:spLocks noGrp="1" noRot="1" noChangeAspect="1"/>
+          </p:cNvSpPr>
+          <p:nvPr>
+            <p:ph type="sldImg"/>
+          </p:nvPr>
+        </p:nvSpPr>
+        <p:spPr/>
+      </p:sp>
+      <p:sp>
+        <p:nvSpPr>
+          <p:cNvPr id="3" name="Notes Placeholder 2"/>
+          <p:cNvSpPr>
+            <a:spLocks noGrp="1"/>
+          </p:cNvSpPr>
+          <p:nvPr>
+            <p:ph type="body" idx="1"/>
+          </p:nvPr>
+        </p:nvSpPr>
+        <p:spPr/>
+        <p:txBody>
+          <a:bodyPr>
+            <a:normAutofit/>
+          </a:bodyPr>
+          <a:lstStyle/>
+          <a:p>
+            <a:endParaRPr lang="en-US" dirty="0"/>
+          </a:p>
+        </p:txBody>
+      </p:sp>
+      <p:sp>
+        <p:nvSpPr>
+          <p:cNvPr id="4" name="Slide Number Placeholder 3"/>
+          <p:cNvSpPr>
+            <a:spLocks noGrp="1"/>
+          </p:cNvSpPr>
+          <p:nvPr>
+            <p:ph type="sldNum" sz="quarter" idx="10"/>
+          </p:nvPr>
+        </p:nvSpPr>
+        <p:spPr/>
+        <p:txBody>
+          <a:bodyPr/>
+          <a:lstStyle/>
+          <a:p>
+            <a:fld id="{394D8DB5-5FC1-4510-BABE-87359DBFAF17}" type="slidenum">
+              <a:rPr lang="en-US" smtClean="0"/>
+              <a:pPr/>
+              <a:t>9</a:t>
             </a:fld>
             <a:endParaRPr lang="en-US"/>
           </a:p>
@@ -14095,7 +14869,7 @@
             <a:fld id="{F390FA6F-46DA-449E-BCA1-C46472DB8D2B}" type="datetimeFigureOut">
               <a:rPr lang="en-US" smtClean="0"/>
               <a:pPr/>
-              <a:t>3/29/2014</a:t>
+              <a:t>4/1/2014</a:t>
             </a:fld>
             <a:endParaRPr lang="en-US"/>
           </a:p>
@@ -14456,7 +15230,7 @@
             <a:fld id="{F390FA6F-46DA-449E-BCA1-C46472DB8D2B}" type="datetimeFigureOut">
               <a:rPr lang="en-US" smtClean="0"/>
               <a:pPr/>
-              <a:t>3/29/2014</a:t>
+              <a:t>4/1/2014</a:t>
             </a:fld>
             <a:endParaRPr lang="en-US"/>
           </a:p>
@@ -14633,7 +15407,7 @@
             <a:fld id="{F390FA6F-46DA-449E-BCA1-C46472DB8D2B}" type="datetimeFigureOut">
               <a:rPr lang="en-US" smtClean="0"/>
               <a:pPr/>
-              <a:t>3/29/2014</a:t>
+              <a:t>4/1/2014</a:t>
             </a:fld>
             <a:endParaRPr lang="en-US"/>
           </a:p>
@@ -14870,7 +15644,7 @@
             <a:fld id="{F390FA6F-46DA-449E-BCA1-C46472DB8D2B}" type="datetimeFigureOut">
               <a:rPr lang="en-US" smtClean="0"/>
               <a:pPr/>
-              <a:t>3/29/2014</a:t>
+              <a:t>4/1/2014</a:t>
             </a:fld>
             <a:endParaRPr lang="en-US"/>
           </a:p>
@@ -15141,7 +15915,7 @@
             <a:fld id="{F390FA6F-46DA-449E-BCA1-C46472DB8D2B}" type="datetimeFigureOut">
               <a:rPr lang="en-US" smtClean="0"/>
               <a:pPr/>
-              <a:t>3/29/2014</a:t>
+              <a:t>4/1/2014</a:t>
             </a:fld>
             <a:endParaRPr lang="en-US"/>
           </a:p>
@@ -15363,7 +16137,7 @@
             <a:fld id="{F390FA6F-46DA-449E-BCA1-C46472DB8D2B}" type="datetimeFigureOut">
               <a:rPr lang="en-US" smtClean="0"/>
               <a:pPr/>
-              <a:t>3/29/2014</a:t>
+              <a:t>4/1/2014</a:t>
             </a:fld>
             <a:endParaRPr lang="en-US"/>
           </a:p>
@@ -15717,7 +16491,7 @@
             <a:fld id="{F390FA6F-46DA-449E-BCA1-C46472DB8D2B}" type="datetimeFigureOut">
               <a:rPr lang="en-US" smtClean="0"/>
               <a:pPr/>
-              <a:t>3/29/2014</a:t>
+              <a:t>4/1/2014</a:t>
             </a:fld>
             <a:endParaRPr lang="en-US"/>
           </a:p>
@@ -15951,7 +16725,7 @@
             <a:fld id="{F390FA6F-46DA-449E-BCA1-C46472DB8D2B}" type="datetimeFigureOut">
               <a:rPr lang="en-US" smtClean="0"/>
               <a:pPr/>
-              <a:t>3/29/2014</a:t>
+              <a:t>4/1/2014</a:t>
             </a:fld>
             <a:endParaRPr lang="en-US"/>
           </a:p>
@@ -16093,7 +16867,7 @@
             <a:fld id="{F390FA6F-46DA-449E-BCA1-C46472DB8D2B}" type="datetimeFigureOut">
               <a:rPr lang="en-US" smtClean="0"/>
               <a:pPr/>
-              <a:t>3/29/2014</a:t>
+              <a:t>4/1/2014</a:t>
             </a:fld>
             <a:endParaRPr lang="en-US"/>
           </a:p>
@@ -16372,7 +17146,7 @@
             <a:fld id="{F390FA6F-46DA-449E-BCA1-C46472DB8D2B}" type="datetimeFigureOut">
               <a:rPr lang="en-US" smtClean="0"/>
               <a:pPr/>
-              <a:t>3/29/2014</a:t>
+              <a:t>4/1/2014</a:t>
             </a:fld>
             <a:endParaRPr lang="en-US"/>
           </a:p>
@@ -16781,7 +17555,7 @@
             <a:fld id="{F390FA6F-46DA-449E-BCA1-C46472DB8D2B}" type="datetimeFigureOut">
               <a:rPr lang="en-US" smtClean="0"/>
               <a:pPr/>
-              <a:t>3/29/2014</a:t>
+              <a:t>4/1/2014</a:t>
             </a:fld>
             <a:endParaRPr lang="en-US"/>
           </a:p>
@@ -17121,7 +17895,7 @@
             <a:fld id="{F390FA6F-46DA-449E-BCA1-C46472DB8D2B}" type="datetimeFigureOut">
               <a:rPr lang="en-US" smtClean="0"/>
               <a:pPr/>
-              <a:t>3/29/2014</a:t>
+              <a:t>4/1/2014</a:t>
             </a:fld>
             <a:endParaRPr lang="en-US"/>
           </a:p>
@@ -17744,35 +18518,32 @@
           <a:p>
             <a:r>
               <a:rPr lang="en-US" dirty="0" smtClean="0"/>
-              <a:t>Questions?</a:t>
+              <a:t>NFC Security: Concerns (Brandi)</a:t>
             </a:r>
             <a:endParaRPr lang="en-US" dirty="0"/>
           </a:p>
         </p:txBody>
       </p:sp>
-      <p:pic>
-        <p:nvPicPr>
-          <p:cNvPr id="4" name="Content Placeholder 3" descr="question.jpg"/>
-          <p:cNvPicPr>
-            <a:picLocks noGrp="1" noChangeAspect="1"/>
-          </p:cNvPicPr>
+      <p:graphicFrame>
+        <p:nvGraphicFramePr>
+          <p:cNvPr id="4" name="Content Placeholder 3"/>
+          <p:cNvGraphicFramePr>
+            <a:graphicFrameLocks noGrp="1"/>
+          </p:cNvGraphicFramePr>
           <p:nvPr>
             <p:ph sz="quarter" idx="1"/>
           </p:nvPr>
-        </p:nvPicPr>
-        <p:blipFill>
-          <a:blip r:embed="rId2" cstate="print"/>
-          <a:stretch>
-            <a:fillRect/>
-          </a:stretch>
-        </p:blipFill>
-        <p:spPr>
-          <a:xfrm>
-            <a:off x="3109912" y="1401762"/>
-            <a:ext cx="2924175" cy="4572000"/>
-          </a:xfrm>
-        </p:spPr>
-      </p:pic>
+        </p:nvGraphicFramePr>
+        <p:xfrm>
+          <a:off x="457200" y="1219200"/>
+          <a:ext cx="8229600" cy="4937760"/>
+        </p:xfrm>
+        <a:graphic>
+          <a:graphicData uri="http://schemas.openxmlformats.org/drawingml/2006/diagram">
+            <dgm:relIds xmlns:dgm="http://schemas.openxmlformats.org/drawingml/2006/diagram" xmlns:r="http://schemas.openxmlformats.org/officeDocument/2006/relationships" r:dm="rId3" r:lo="rId4" r:qs="rId5" r:cs="rId6"/>
+          </a:graphicData>
+        </a:graphic>
+      </p:graphicFrame>
     </p:spTree>
   </p:cSld>
   <p:clrMapOvr>
@@ -17822,6 +18593,84 @@
           <a:p>
             <a:r>
               <a:rPr lang="en-US" dirty="0" smtClean="0"/>
+              <a:t>Questions?</a:t>
+            </a:r>
+            <a:endParaRPr lang="en-US" dirty="0"/>
+          </a:p>
+        </p:txBody>
+      </p:sp>
+      <p:pic>
+        <p:nvPicPr>
+          <p:cNvPr id="4" name="Content Placeholder 3" descr="question.jpg"/>
+          <p:cNvPicPr>
+            <a:picLocks noGrp="1" noChangeAspect="1"/>
+          </p:cNvPicPr>
+          <p:nvPr>
+            <p:ph sz="quarter" idx="1"/>
+          </p:nvPr>
+        </p:nvPicPr>
+        <p:blipFill>
+          <a:blip r:embed="rId3" cstate="print"/>
+          <a:stretch>
+            <a:fillRect/>
+          </a:stretch>
+        </p:blipFill>
+        <p:spPr>
+          <a:xfrm>
+            <a:off x="3109912" y="1401762"/>
+            <a:ext cx="2924175" cy="4572000"/>
+          </a:xfrm>
+        </p:spPr>
+      </p:pic>
+    </p:spTree>
+  </p:cSld>
+  <p:clrMapOvr>
+    <a:masterClrMapping/>
+  </p:clrMapOvr>
+  <p:timing>
+    <p:tnLst>
+      <p:par>
+        <p:cTn id="1" dur="indefinite" restart="never" nodeType="tmRoot"/>
+      </p:par>
+    </p:tnLst>
+  </p:timing>
+</p:sld>
+</file>
+
+<file path=ppt/slides/slide12.xml><?xml version="1.0" encoding="utf-8"?>
+<p:sld xmlns:a="http://schemas.openxmlformats.org/drawingml/2006/main" xmlns:r="http://schemas.openxmlformats.org/officeDocument/2006/relationships" xmlns:p="http://schemas.openxmlformats.org/presentationml/2006/main">
+  <p:cSld>
+    <p:spTree>
+      <p:nvGrpSpPr>
+        <p:cNvPr id="1" name=""/>
+        <p:cNvGrpSpPr/>
+        <p:nvPr/>
+      </p:nvGrpSpPr>
+      <p:grpSpPr>
+        <a:xfrm>
+          <a:off x="0" y="0"/>
+          <a:ext cx="0" cy="0"/>
+          <a:chOff x="0" y="0"/>
+          <a:chExt cx="0" cy="0"/>
+        </a:xfrm>
+      </p:grpSpPr>
+      <p:sp>
+        <p:nvSpPr>
+          <p:cNvPr id="2" name="Title 1"/>
+          <p:cNvSpPr>
+            <a:spLocks noGrp="1"/>
+          </p:cNvSpPr>
+          <p:nvPr>
+            <p:ph type="title"/>
+          </p:nvPr>
+        </p:nvSpPr>
+        <p:spPr/>
+        <p:txBody>
+          <a:bodyPr/>
+          <a:lstStyle/>
+          <a:p>
+            <a:r>
+              <a:rPr lang="en-US" dirty="0" smtClean="0"/>
               <a:t>References</a:t>
             </a:r>
             <a:endParaRPr lang="en-US" dirty="0"/>
@@ -17841,21 +18690,13 @@
         <p:spPr/>
         <p:txBody>
           <a:bodyPr>
-            <a:normAutofit fontScale="77500" lnSpcReduction="20000"/>
+            <a:normAutofit fontScale="55000" lnSpcReduction="20000"/>
           </a:bodyPr>
           <a:lstStyle/>
           <a:p>
             <a:r>
               <a:rPr lang="en-US" dirty="0" smtClean="0"/>
-              <a:t>Murray, Kevin D. “The Great Seal Bug Story.” Murray Associates, May 4 2011. Web. 27 May 2013</a:t>
-            </a:r>
-            <a:r>
-              <a:rPr lang="en-US" dirty="0" smtClean="0"/>
-              <a:t>. &lt;http://</a:t>
-            </a:r>
-            <a:r>
-              <a:rPr lang="en-US" dirty="0" smtClean="0"/>
-              <a:t>www.spybusters.com/Great_Seal_Bug.html&gt;</a:t>
+              <a:t>Murray, Kevin D. “The Great Seal Bug Story.” Murray Associates, May 4 2011. Web. 27 May 2013. &lt;http://www.spybusters.com/Great_Seal_Bug.html&gt;</a:t>
             </a:r>
           </a:p>
           <a:p>
@@ -17869,41 +18710,13 @@
             </a:r>
             <a:r>
               <a:rPr lang="en-US" dirty="0" smtClean="0"/>
-              <a:t> but True: The Theremin.” Mr. J’s Music Room, Jan 2 </a:t>
+              <a:t> but True: The Theremin.” Mr. J’s Music Room, Jan 2 2011. Web. 27 May 2013. &lt;http://mrjsmusicroom.com/wierd%20but%20true/wierd%20but%20true%20january.html&gt;</a:t>
             </a:r>
+          </a:p>
+          <a:p>
             <a:r>
               <a:rPr lang="en-US" dirty="0" smtClean="0"/>
-              <a:t>2011. Web. 27 May 2013. </a:t>
-            </a:r>
-            <a:r>
-              <a:rPr lang="en-US" dirty="0" smtClean="0"/>
-              <a:t>&lt;http</a:t>
-            </a:r>
-            <a:r>
-              <a:rPr lang="en-US" dirty="0" smtClean="0"/>
-              <a:t>://</a:t>
-            </a:r>
-            <a:r>
-              <a:rPr lang="en-US" dirty="0" smtClean="0"/>
-              <a:t>mrjsmusicroom.com/wierd%20but%20true/wierd%20but%20true%20january.html&gt;</a:t>
-            </a:r>
-          </a:p>
-          <a:p>
-            <a:r>
-              <a:rPr lang="en-US" dirty="0" smtClean="0"/>
-              <a:t>Peter Pringle. “</a:t>
-            </a:r>
-            <a:r>
-              <a:rPr lang="en-US" dirty="0" smtClean="0"/>
-              <a:t>THEREMIN - Over The </a:t>
-            </a:r>
-            <a:r>
-              <a:rPr lang="en-US" dirty="0" smtClean="0"/>
-              <a:t>Rainbow.” </a:t>
-            </a:r>
-            <a:r>
-              <a:rPr lang="en-US" dirty="0" smtClean="0"/>
-              <a:t>Video. </a:t>
+              <a:t>Peter Pringle. “THEREMIN - Over The Rainbow.” Video. </a:t>
             </a:r>
             <a:r>
               <a:rPr lang="en-US" dirty="0" err="1" smtClean="0"/>
@@ -17911,27 +18724,7 @@
             </a:r>
             <a:r>
               <a:rPr lang="en-US" dirty="0" smtClean="0"/>
-              <a:t>, </a:t>
-            </a:r>
-            <a:r>
-              <a:rPr lang="en-US" dirty="0" smtClean="0"/>
-              <a:t>Jan 10 2009. </a:t>
-            </a:r>
-            <a:r>
-              <a:rPr lang="en-US" dirty="0" smtClean="0"/>
-              <a:t>Web. 27 May 2013. </a:t>
-            </a:r>
-            <a:r>
-              <a:rPr lang="en-US" dirty="0" smtClean="0"/>
-              <a:t>&lt;https</a:t>
-            </a:r>
-            <a:r>
-              <a:rPr lang="en-US" dirty="0" smtClean="0"/>
-              <a:t>://</a:t>
-            </a:r>
-            <a:r>
-              <a:rPr lang="en-US" dirty="0" smtClean="0"/>
-              <a:t>www.youtube.com/watch?v=xcTPRjiCs6s#t=7&gt;</a:t>
+              <a:t>, Jan 10 2009. Web. 27 May 2013. &lt;https://www.youtube.com/watch?v=xcTPRjiCs6s#t=7&gt;</a:t>
             </a:r>
           </a:p>
           <a:p>
@@ -17941,15 +18734,7 @@
             </a:r>
             <a:r>
               <a:rPr lang="en-US" dirty="0" smtClean="0"/>
-              <a:t>. “</a:t>
-            </a:r>
-            <a:r>
-              <a:rPr lang="en-US" dirty="0" smtClean="0"/>
-              <a:t>UN Spy Debate, Reds 'Bugged' American Embassy </a:t>
-            </a:r>
-            <a:r>
-              <a:rPr lang="en-US" dirty="0" smtClean="0"/>
-              <a:t>1960/5/27.” Video. </a:t>
+              <a:t>. “UN Spy Debate, Reds 'Bugged' American Embassy 1960/5/27.” Video. </a:t>
             </a:r>
             <a:r>
               <a:rPr lang="en-US" dirty="0" err="1" smtClean="0"/>
@@ -17957,17 +18742,8 @@
             </a:r>
             <a:r>
               <a:rPr lang="en-US" dirty="0" smtClean="0"/>
-              <a:t>, Sep 13 2006. Web. 27 May 2013</a:t>
+              <a:t>, Sep 13 2006. Web. 27 May 2013. &lt;https://www.youtube.com/watch?v=YPJjxiuyy4A&gt;</a:t>
             </a:r>
-            <a:r>
-              <a:rPr lang="en-US" dirty="0" smtClean="0"/>
-              <a:t>. &lt;https://</a:t>
-            </a:r>
-            <a:r>
-              <a:rPr lang="en-US" dirty="0" smtClean="0"/>
-              <a:t>www.youtube.com/watch?v=YPJjxiuyy4A&gt;</a:t>
-            </a:r>
-            <a:endParaRPr lang="en-US" dirty="0" smtClean="0"/>
           </a:p>
           <a:p>
             <a:r>
@@ -17996,15 +18772,7 @@
             </a:r>
             <a:r>
               <a:rPr lang="en-US" dirty="0" smtClean="0"/>
-              <a:t>. “Practical </a:t>
-            </a:r>
-            <a:r>
-              <a:rPr lang="en-US" dirty="0" smtClean="0"/>
-              <a:t>Experiences with NFC Security </a:t>
-            </a:r>
-            <a:r>
-              <a:rPr lang="en-US" dirty="0" smtClean="0"/>
-              <a:t>on Mobile Phones.” </a:t>
+              <a:t>. “Practical Experiences with NFC Security on Mobile Phones.” </a:t>
             </a:r>
             <a:r>
               <a:rPr lang="en-US" dirty="0" err="1" smtClean="0"/>
@@ -18020,12 +18788,66 @@
             </a:r>
             <a:r>
               <a:rPr lang="en-US" dirty="0" smtClean="0"/>
-              <a:t> </a:t>
+              <a:t> Leuven.</a:t>
             </a:r>
+          </a:p>
+          <a:p>
             <a:r>
               <a:rPr lang="en-US" dirty="0" smtClean="0"/>
-              <a:t>Leuven.</a:t>
+              <a:t>Everything You Need to Know About Near Field Communication | Popular Science </a:t>
             </a:r>
+          </a:p>
+          <a:p>
+            <a:r>
+              <a:rPr lang="en-US" dirty="0" smtClean="0">
+                <a:hlinkClick r:id="rId3"/>
+              </a:rPr>
+              <a:t>http://www.popsci.com/gadgets/article/2011-02/near-field-communication-helping-your-</a:t>
+            </a:r>
+          </a:p>
+          <a:p>
+            <a:r>
+              <a:rPr lang="en-US" dirty="0" smtClean="0">
+                <a:hlinkClick r:id="rId3"/>
+              </a:rPr>
+              <a:t>smartphone-replace-your-wallet-2010</a:t>
+            </a:r>
+            <a:endParaRPr lang="en-US" dirty="0" smtClean="0"/>
+          </a:p>
+          <a:p>
+            <a:pPr lvl="1"/>
+            <a:r>
+              <a:rPr lang="en-US" dirty="0" smtClean="0"/>
+              <a:t>What is NFC? How does NFC work? For what might you use NFC? - a quick guide to NFC - PC Advisor</a:t>
+            </a:r>
+          </a:p>
+          <a:p>
+            <a:pPr lvl="1"/>
+            <a:r>
+              <a:rPr lang="en-US" dirty="0" smtClean="0"/>
+              <a:t>http://www.pcadvisor.co.uk/how-to/mobile-phone/3472879/what-is-nfc-how-nfc-works-what-it-does/</a:t>
+            </a:r>
+          </a:p>
+          <a:p>
+            <a:pPr lvl="1"/>
+            <a:endParaRPr lang="en-US" dirty="0" smtClean="0"/>
+          </a:p>
+          <a:p>
+            <a:pPr lvl="1"/>
+            <a:r>
+              <a:rPr lang="en-US" dirty="0" smtClean="0"/>
+              <a:t>How it Works: NFC (near field communication)</a:t>
+            </a:r>
+          </a:p>
+          <a:p>
+            <a:pPr lvl="1"/>
+            <a:r>
+              <a:rPr lang="en-US" dirty="0" smtClean="0"/>
+              <a:t>http://www.androidauthority.com/how-it-works-nfc-near-field-communication-97144/</a:t>
+            </a:r>
+          </a:p>
+          <a:p>
+            <a:pPr lvl="1"/>
             <a:endParaRPr lang="en-US" dirty="0"/>
           </a:p>
         </p:txBody>
@@ -18079,11 +18901,7 @@
           <a:p>
             <a:r>
               <a:rPr lang="en-US" dirty="0" smtClean="0"/>
-              <a:t>What is NFC</a:t>
-            </a:r>
-            <a:r>
-              <a:rPr lang="en-US" dirty="0" smtClean="0"/>
-              <a:t>? (Brandi)</a:t>
+              <a:t>What is NFC? (Brandi)</a:t>
             </a:r>
             <a:endParaRPr lang="en-US" dirty="0"/>
           </a:p>
@@ -18105,7 +18923,7 @@
         </p:xfrm>
         <a:graphic>
           <a:graphicData uri="http://schemas.openxmlformats.org/drawingml/2006/diagram">
-            <dgm:relIds xmlns:dgm="http://schemas.openxmlformats.org/drawingml/2006/diagram" xmlns:r="http://schemas.openxmlformats.org/officeDocument/2006/relationships" r:dm="rId2" r:lo="rId3" r:qs="rId4" r:cs="rId5"/>
+            <dgm:relIds xmlns:dgm="http://schemas.openxmlformats.org/drawingml/2006/diagram" xmlns:r="http://schemas.openxmlformats.org/officeDocument/2006/relationships" r:dm="rId3" r:lo="rId4" r:qs="rId5" r:cs="rId6"/>
           </a:graphicData>
         </a:graphic>
       </p:graphicFrame>
@@ -18158,11 +18976,7 @@
           <a:p>
             <a:r>
               <a:rPr lang="en-US" dirty="0" smtClean="0"/>
-              <a:t>3 Modes of </a:t>
-            </a:r>
-            <a:r>
-              <a:rPr lang="en-US" dirty="0" smtClean="0"/>
-              <a:t>Operation (Brandi)</a:t>
+              <a:t>3 Modes of Operation (Brandi)</a:t>
             </a:r>
             <a:endParaRPr lang="en-US" dirty="0"/>
           </a:p>
@@ -18184,7 +18998,7 @@
         </p:xfrm>
         <a:graphic>
           <a:graphicData uri="http://schemas.openxmlformats.org/drawingml/2006/diagram">
-            <dgm:relIds xmlns:dgm="http://schemas.openxmlformats.org/drawingml/2006/diagram" xmlns:r="http://schemas.openxmlformats.org/officeDocument/2006/relationships" r:dm="rId2" r:lo="rId3" r:qs="rId4" r:cs="rId5"/>
+            <dgm:relIds xmlns:dgm="http://schemas.openxmlformats.org/drawingml/2006/diagram" xmlns:r="http://schemas.openxmlformats.org/officeDocument/2006/relationships" r:dm="rId3" r:lo="rId4" r:qs="rId5" r:cs="rId6"/>
           </a:graphicData>
         </a:graphic>
       </p:graphicFrame>
@@ -18239,11 +19053,7 @@
           <a:p>
             <a:r>
               <a:rPr lang="en-US" dirty="0" smtClean="0"/>
-              <a:t>NFC History (Brandi</a:t>
-            </a:r>
-            <a:r>
-              <a:rPr lang="en-US" dirty="0" smtClean="0"/>
-              <a:t>): </a:t>
+              <a:t>NFC History (Brandi): </a:t>
             </a:r>
             <a:r>
               <a:rPr lang="en-US" dirty="0" smtClean="0">
@@ -18432,11 +19242,7 @@
           <a:p>
             <a:r>
               <a:rPr lang="en-US" dirty="0" smtClean="0"/>
-              <a:t>NFC History (Brandi</a:t>
-            </a:r>
-            <a:r>
-              <a:rPr lang="en-US" dirty="0" smtClean="0"/>
-              <a:t>): </a:t>
+              <a:t>NFC History (Brandi): </a:t>
             </a:r>
             <a:r>
               <a:rPr lang="en-US" dirty="0" smtClean="0">
@@ -18604,7 +19410,59 @@
           <a:bodyPr/>
           <a:lstStyle/>
           <a:p>
-            <a:endParaRPr lang="en-US"/>
+            <a:r>
+              <a:rPr lang="en-US" dirty="0" smtClean="0"/>
+              <a:t>NFC is an outgrowth of RFID.</a:t>
+            </a:r>
+          </a:p>
+          <a:p>
+            <a:r>
+              <a:rPr lang="en-US" dirty="0" smtClean="0"/>
+              <a:t>NFC uses electromagnetic induction to generate current and exchange information</a:t>
+            </a:r>
+            <a:r>
+              <a:rPr lang="en-US" dirty="0" smtClean="0"/>
+              <a:t>.</a:t>
+            </a:r>
+          </a:p>
+          <a:p>
+            <a:r>
+              <a:rPr lang="en-US" dirty="0" smtClean="0"/>
+              <a:t>NFC has a maximum transmission rate of approximately 480kbs.</a:t>
+            </a:r>
+          </a:p>
+          <a:p>
+            <a:endParaRPr lang="en-US" dirty="0" smtClean="0"/>
+          </a:p>
+          <a:p>
+            <a:r>
+              <a:rPr lang="en-US" dirty="0" smtClean="0"/>
+              <a:t>Absolute Maximum </a:t>
+            </a:r>
+            <a:r>
+              <a:rPr lang="en-US" dirty="0" smtClean="0"/>
+              <a:t>range: 20cm (7.5 inches</a:t>
+            </a:r>
+            <a:r>
+              <a:rPr lang="en-US" dirty="0" smtClean="0"/>
+              <a:t>).</a:t>
+            </a:r>
+          </a:p>
+          <a:p>
+            <a:r>
+              <a:rPr lang="en-US" dirty="0" smtClean="0"/>
+              <a:t>Practical Maximum range 10cm (4 inches).</a:t>
+            </a:r>
+            <a:endParaRPr lang="en-US" dirty="0" smtClean="0"/>
+          </a:p>
+          <a:p>
+            <a:r>
+              <a:rPr lang="en-US" dirty="0" smtClean="0"/>
+              <a:t>Ideal range: 4cm (1.5 inches).</a:t>
+            </a:r>
+          </a:p>
+          <a:p>
+            <a:endParaRPr lang="en-US" dirty="0"/>
           </a:p>
         </p:txBody>
       </p:sp>
@@ -18657,11 +19515,7 @@
           <a:p>
             <a:r>
               <a:rPr lang="en-US" dirty="0" smtClean="0"/>
-              <a:t>NFC Future (Don</a:t>
-            </a:r>
-            <a:r>
-              <a:rPr lang="en-US" dirty="0" smtClean="0"/>
-              <a:t>)</a:t>
+              <a:t>Technical Details (II)</a:t>
             </a:r>
             <a:endParaRPr lang="en-US" dirty="0"/>
           </a:p>
@@ -18682,6 +19536,27 @@
           <a:bodyPr/>
           <a:lstStyle/>
           <a:p>
+            <a:pPr>
+              <a:buNone/>
+            </a:pPr>
+            <a:r>
+              <a:rPr lang="en-US" dirty="0" smtClean="0"/>
+              <a:t>NFC Protocols:</a:t>
+            </a:r>
+          </a:p>
+          <a:p>
+            <a:pPr>
+              <a:buNone/>
+            </a:pPr>
+            <a:r>
+              <a:rPr lang="en-US" dirty="0" smtClean="0"/>
+              <a:t>ISO 14443 (already used by RFID for secure information transfer for credit-card processing).</a:t>
+            </a:r>
+          </a:p>
+          <a:p>
+            <a:pPr>
+              <a:buNone/>
+            </a:pPr>
             <a:endParaRPr lang="en-US" dirty="0"/>
           </a:p>
         </p:txBody>
@@ -18691,13 +19566,6 @@
   <p:clrMapOvr>
     <a:masterClrMapping/>
   </p:clrMapOvr>
-  <p:timing>
-    <p:tnLst>
-      <p:par>
-        <p:cTn id="1" dur="indefinite" restart="never" nodeType="tmRoot"/>
-      </p:par>
-    </p:tnLst>
-  </p:timing>
 </p:sld>
 </file>
 
@@ -18735,36 +19603,210 @@
           <a:p>
             <a:r>
               <a:rPr lang="en-US" dirty="0" smtClean="0"/>
-              <a:t>NFC vs. </a:t>
+              <a:t>NFC </a:t>
             </a:r>
             <a:r>
               <a:rPr lang="en-US" dirty="0" smtClean="0"/>
-              <a:t>Bluetooth (Brandi)</a:t>
+              <a:t>USES</a:t>
             </a:r>
             <a:endParaRPr lang="en-US" dirty="0"/>
           </a:p>
         </p:txBody>
       </p:sp>
-      <p:graphicFrame>
-        <p:nvGraphicFramePr>
-          <p:cNvPr id="6" name="Content Placeholder 5"/>
-          <p:cNvGraphicFramePr>
-            <a:graphicFrameLocks noGrp="1"/>
-          </p:cNvGraphicFramePr>
+      <p:sp>
+        <p:nvSpPr>
+          <p:cNvPr id="3" name="Content Placeholder 2"/>
+          <p:cNvSpPr>
+            <a:spLocks noGrp="1"/>
+          </p:cNvSpPr>
           <p:nvPr>
             <p:ph sz="quarter" idx="1"/>
           </p:nvPr>
-        </p:nvGraphicFramePr>
-        <p:xfrm>
-          <a:off x="457200" y="1219200"/>
-          <a:ext cx="8229600" cy="4937760"/>
-        </p:xfrm>
-        <a:graphic>
-          <a:graphicData uri="http://schemas.openxmlformats.org/drawingml/2006/diagram">
-            <dgm:relIds xmlns:dgm="http://schemas.openxmlformats.org/drawingml/2006/diagram" xmlns:r="http://schemas.openxmlformats.org/officeDocument/2006/relationships" r:dm="rId3" r:lo="rId4" r:qs="rId5" r:cs="rId6"/>
-          </a:graphicData>
-        </a:graphic>
-      </p:graphicFrame>
+        </p:nvSpPr>
+        <p:spPr/>
+        <p:txBody>
+          <a:bodyPr>
+            <a:normAutofit fontScale="77500" lnSpcReduction="20000"/>
+          </a:bodyPr>
+          <a:lstStyle/>
+          <a:p>
+            <a:r>
+              <a:rPr lang="en-US" dirty="0" smtClean="0"/>
+              <a:t>PAIR:</a:t>
+            </a:r>
+          </a:p>
+          <a:p>
+            <a:pPr lvl="1"/>
+            <a:r>
+              <a:rPr lang="en-US" dirty="0" smtClean="0"/>
+              <a:t>Pair two </a:t>
+            </a:r>
+            <a:r>
+              <a:rPr lang="en-US" dirty="0" err="1" smtClean="0"/>
+              <a:t>nfc</a:t>
+            </a:r>
+            <a:r>
+              <a:rPr lang="en-US" dirty="0" smtClean="0"/>
+              <a:t>-enabled devices by a simple bump (easier than by </a:t>
+            </a:r>
+            <a:r>
+              <a:rPr lang="en-US" dirty="0" err="1" smtClean="0"/>
+              <a:t>bluetooth</a:t>
+            </a:r>
+            <a:r>
+              <a:rPr lang="en-US" dirty="0" smtClean="0"/>
+              <a:t>).</a:t>
+            </a:r>
+          </a:p>
+          <a:p>
+            <a:pPr lvl="2">
+              <a:buNone/>
+            </a:pPr>
+            <a:r>
+              <a:rPr lang="en-US" dirty="0" smtClean="0"/>
+              <a:t>Connect phone to speakers or other </a:t>
+            </a:r>
+            <a:r>
+              <a:rPr lang="en-US" dirty="0" err="1" smtClean="0"/>
+              <a:t>nfc</a:t>
+            </a:r>
+            <a:r>
+              <a:rPr lang="en-US" dirty="0" smtClean="0"/>
+              <a:t> aware devices</a:t>
+            </a:r>
+          </a:p>
+          <a:p>
+            <a:pPr lvl="2"/>
+            <a:endParaRPr lang="en-US" dirty="0" smtClean="0"/>
+          </a:p>
+          <a:p>
+            <a:r>
+              <a:rPr lang="en-US" dirty="0" smtClean="0"/>
+              <a:t>SHARE:</a:t>
+            </a:r>
+          </a:p>
+          <a:p>
+            <a:pPr lvl="1"/>
+            <a:r>
+              <a:rPr lang="en-US" dirty="0" smtClean="0"/>
+              <a:t>Share contact information with a simple bump of phones.</a:t>
+            </a:r>
+          </a:p>
+          <a:p>
+            <a:pPr lvl="2"/>
+            <a:r>
+              <a:rPr lang="en-US" dirty="0" smtClean="0"/>
+              <a:t>Establish a connection for playing networked games (use </a:t>
+            </a:r>
+            <a:r>
+              <a:rPr lang="en-US" dirty="0" err="1" smtClean="0"/>
+              <a:t>nfc</a:t>
+            </a:r>
+            <a:r>
+              <a:rPr lang="en-US" dirty="0" smtClean="0"/>
+              <a:t> to initiate the </a:t>
+            </a:r>
+            <a:r>
+              <a:rPr lang="en-US" dirty="0" err="1" smtClean="0"/>
+              <a:t>bluetooth</a:t>
+            </a:r>
+            <a:r>
+              <a:rPr lang="en-US" dirty="0" smtClean="0"/>
+              <a:t> / </a:t>
+            </a:r>
+            <a:r>
+              <a:rPr lang="en-US" dirty="0" err="1" smtClean="0"/>
+              <a:t>wifi</a:t>
+            </a:r>
+            <a:r>
+              <a:rPr lang="en-US" dirty="0" smtClean="0"/>
+              <a:t> </a:t>
+            </a:r>
+            <a:r>
+              <a:rPr lang="en-US" dirty="0" err="1" smtClean="0"/>
+              <a:t>adhoc</a:t>
+            </a:r>
+            <a:r>
+              <a:rPr lang="en-US" dirty="0" smtClean="0"/>
+              <a:t> connection).</a:t>
+            </a:r>
+          </a:p>
+          <a:p>
+            <a:pPr lvl="2"/>
+            <a:endParaRPr lang="en-US" dirty="0" smtClean="0"/>
+          </a:p>
+          <a:p>
+            <a:r>
+              <a:rPr lang="en-US" dirty="0" smtClean="0"/>
+              <a:t>TRANSACTIONS:</a:t>
+            </a:r>
+          </a:p>
+          <a:p>
+            <a:pPr lvl="1"/>
+            <a:r>
+              <a:rPr lang="en-US" dirty="0" smtClean="0"/>
+              <a:t>Use to pay at </a:t>
+            </a:r>
+            <a:r>
+              <a:rPr lang="en-US" dirty="0" err="1" smtClean="0"/>
+              <a:t>nfc</a:t>
+            </a:r>
+            <a:r>
+              <a:rPr lang="en-US" dirty="0" smtClean="0"/>
+              <a:t>-enabled payment stations (similar to swiping a transit card to pay a toll).</a:t>
+            </a:r>
+          </a:p>
+          <a:p>
+            <a:pPr lvl="2">
+              <a:buNone/>
+            </a:pPr>
+            <a:r>
+              <a:rPr lang="en-US" dirty="0" smtClean="0"/>
+              <a:t>Eventually replace the need to carry all kinds of credit cards</a:t>
+            </a:r>
+          </a:p>
+          <a:p>
+            <a:pPr lvl="2"/>
+            <a:endParaRPr lang="en-US" dirty="0" smtClean="0"/>
+          </a:p>
+          <a:p>
+            <a:pPr lvl="2"/>
+            <a:r>
+              <a:rPr lang="en-US" dirty="0" smtClean="0"/>
+              <a:t>IDENTIFICATION:</a:t>
+            </a:r>
+          </a:p>
+          <a:p>
+            <a:pPr lvl="3"/>
+            <a:r>
+              <a:rPr lang="en-US" dirty="0" smtClean="0"/>
+              <a:t>Could be used in place of government issued ID.</a:t>
+            </a:r>
+          </a:p>
+          <a:p>
+            <a:pPr lvl="4">
+              <a:buNone/>
+            </a:pPr>
+            <a:r>
+              <a:rPr lang="en-US" dirty="0" smtClean="0"/>
+              <a:t>Could be used to replace corporate ID badges</a:t>
+            </a:r>
+          </a:p>
+          <a:p>
+            <a:pPr lvl="5">
+              <a:buNone/>
+            </a:pPr>
+            <a:r>
+              <a:rPr lang="en-US" dirty="0" smtClean="0"/>
+              <a:t>Already used in passports to provide various pieces of personal information.</a:t>
+            </a:r>
+          </a:p>
+          <a:p>
+            <a:pPr lvl="5"/>
+            <a:endParaRPr lang="en-US" dirty="0"/>
+          </a:p>
+        </p:txBody>
+      </p:sp>
     </p:spTree>
   </p:cSld>
   <p:clrMapOvr>
@@ -18814,7 +19856,7 @@
           <a:p>
             <a:r>
               <a:rPr lang="en-US" dirty="0" smtClean="0"/>
-              <a:t>NFC Security: Concerns (Brandi)</a:t>
+              <a:t>NFC vs. Bluetooth (Brandi)</a:t>
             </a:r>
             <a:endParaRPr lang="en-US" dirty="0"/>
           </a:p>
@@ -18822,7 +19864,7 @@
       </p:sp>
       <p:graphicFrame>
         <p:nvGraphicFramePr>
-          <p:cNvPr id="4" name="Content Placeholder 3"/>
+          <p:cNvPr id="6" name="Content Placeholder 5"/>
           <p:cNvGraphicFramePr>
             <a:graphicFrameLocks noGrp="1"/>
           </p:cNvGraphicFramePr>
@@ -18836,7 +19878,7 @@
         </p:xfrm>
         <a:graphic>
           <a:graphicData uri="http://schemas.openxmlformats.org/drawingml/2006/diagram">
-            <dgm:relIds xmlns:dgm="http://schemas.openxmlformats.org/drawingml/2006/diagram" xmlns:r="http://schemas.openxmlformats.org/officeDocument/2006/relationships" r:dm="rId2" r:lo="rId3" r:qs="rId4" r:cs="rId5"/>
+            <dgm:relIds xmlns:dgm="http://schemas.openxmlformats.org/drawingml/2006/diagram" xmlns:r="http://schemas.openxmlformats.org/officeDocument/2006/relationships" r:dm="rId3" r:lo="rId4" r:qs="rId5" r:cs="rId6"/>
           </a:graphicData>
         </a:graphic>
       </p:graphicFrame>

</xml_diff>